<commit_message>
Week 10: Day 2 uploaded
</commit_message>
<xml_diff>
--- a/week9_ML_svm_poly_norm/day5_ml_concepts_trees_ensembles/ml_concepts/Machine Learning - Concepts v2.pptx
+++ b/week9_ML_svm_poly_norm/day5_ml_concepts_trees_ensembles/ml_concepts/Machine Learning - Concepts v2.pptx
@@ -225,7 +225,7 @@
           <a:p>
             <a:fld id="{CBC3D06E-D880-4630-85C6-508F7CA16EC0}" type="datetimeFigureOut">
               <a:rPr lang="es-ES" smtClean="0"/>
-              <a:t>13/06/2021</a:t>
+              <a:t>14/06/2021</a:t>
             </a:fld>
             <a:endParaRPr lang="es-ES"/>
           </a:p>
@@ -1417,7 +1417,7 @@
             <a:fld id="{1E700B27-DE4C-4B9E-BB11-B9027034A00F}" type="datetimeFigureOut">
               <a:rPr lang="en-US" smtClean="0"/>
               <a:pPr/>
-              <a:t>6/13/2021</a:t>
+              <a:t>6/14/2021</a:t>
             </a:fld>
             <a:endParaRPr lang="en-US" dirty="0"/>
           </a:p>
@@ -1588,7 +1588,7 @@
           <a:p>
             <a:fld id="{80DBE609-F3F2-45E6-BD6A-E03A8C86C1AE}" type="datetimeFigureOut">
               <a:rPr lang="en-US" smtClean="0"/>
-              <a:t>6/13/2021</a:t>
+              <a:t>6/14/2021</a:t>
             </a:fld>
             <a:endParaRPr lang="en-US" dirty="0"/>
           </a:p>
@@ -1769,7 +1769,7 @@
           <a:p>
             <a:fld id="{7A24AD68-089C-4467-A8F3-EA2BBCA6B44E}" type="datetimeFigureOut">
               <a:rPr lang="en-US" smtClean="0"/>
-              <a:t>6/13/2021</a:t>
+              <a:t>6/14/2021</a:t>
             </a:fld>
             <a:endParaRPr lang="en-US" dirty="0"/>
           </a:p>
@@ -1940,7 +1940,7 @@
           <a:p>
             <a:fld id="{75C51FCE-E4BB-4680-8E50-3C0E348D2609}" type="datetimeFigureOut">
               <a:rPr lang="en-US" smtClean="0"/>
-              <a:t>6/13/2021</a:t>
+              <a:t>6/14/2021</a:t>
             </a:fld>
             <a:endParaRPr lang="en-US" dirty="0"/>
           </a:p>
@@ -2187,7 +2187,7 @@
           <a:p>
             <a:fld id="{8AAA073D-A903-47F8-8D16-77642FB0DF1F}" type="datetimeFigureOut">
               <a:rPr lang="en-US" smtClean="0"/>
-              <a:t>6/13/2021</a:t>
+              <a:t>6/14/2021</a:t>
             </a:fld>
             <a:endParaRPr lang="en-US" dirty="0"/>
           </a:p>
@@ -2420,7 +2420,7 @@
           <a:p>
             <a:fld id="{AB91FA40-626B-4CA1-85D0-7A9016E395BA}" type="datetimeFigureOut">
               <a:rPr lang="en-US" smtClean="0"/>
-              <a:t>6/13/2021</a:t>
+              <a:t>6/14/2021</a:t>
             </a:fld>
             <a:endParaRPr lang="en-US" dirty="0"/>
           </a:p>
@@ -2788,7 +2788,7 @@
           <a:p>
             <a:fld id="{C3F425EA-B9DC-48A7-991E-9A82573B1B21}" type="datetimeFigureOut">
               <a:rPr lang="en-US" smtClean="0"/>
-              <a:t>6/13/2021</a:t>
+              <a:t>6/14/2021</a:t>
             </a:fld>
             <a:endParaRPr lang="en-US" dirty="0"/>
           </a:p>
@@ -2907,7 +2907,7 @@
           <a:p>
             <a:fld id="{66CB97F8-6CEB-469B-AFCC-889F2A2B1D5A}" type="datetimeFigureOut">
               <a:rPr lang="en-US" smtClean="0"/>
-              <a:t>6/13/2021</a:t>
+              <a:t>6/14/2021</a:t>
             </a:fld>
             <a:endParaRPr lang="en-US" dirty="0"/>
           </a:p>
@@ -3003,7 +3003,7 @@
           <a:p>
             <a:fld id="{8FA9179F-009E-4FA5-B091-7EBB82A185BD}" type="datetimeFigureOut">
               <a:rPr lang="en-US" smtClean="0"/>
-              <a:t>6/13/2021</a:t>
+              <a:t>6/14/2021</a:t>
             </a:fld>
             <a:endParaRPr lang="en-US" dirty="0"/>
           </a:p>
@@ -3281,7 +3281,7 @@
           <a:p>
             <a:fld id="{8E665CEB-0076-4E37-B880-BCEA9784DE0A}" type="datetimeFigureOut">
               <a:rPr lang="en-US" smtClean="0"/>
-              <a:t>6/13/2021</a:t>
+              <a:t>6/14/2021</a:t>
             </a:fld>
             <a:endParaRPr lang="en-US" dirty="0"/>
           </a:p>
@@ -3539,7 +3539,7 @@
           <a:p>
             <a:fld id="{A6149E5E-3896-4118-99A7-7B85668F1C5E}" type="datetimeFigureOut">
               <a:rPr lang="en-US" smtClean="0"/>
-              <a:t>6/13/2021</a:t>
+              <a:t>6/14/2021</a:t>
             </a:fld>
             <a:endParaRPr lang="en-US" dirty="0"/>
           </a:p>
@@ -3753,7 +3753,7 @@
           <a:p>
             <a:fld id="{7E0D914D-B099-4142-A885-11F276715148}" type="datetimeFigureOut">
               <a:rPr lang="en-US" smtClean="0"/>
-              <a:t>6/13/2021</a:t>
+              <a:t>6/14/2021</a:t>
             </a:fld>
             <a:endParaRPr lang="en-US" dirty="0"/>
           </a:p>
@@ -5463,6 +5463,14 @@
             <a:r>
               <a:rPr lang="en-GB" sz="1800" dirty="0" err="1"/>
               <a:t>Exhaustividad</a:t>
+            </a:r>
+            <a:r>
+              <a:rPr lang="en-GB" sz="1800" dirty="0"/>
+              <a:t>/</a:t>
+            </a:r>
+            <a:r>
+              <a:rPr lang="en-GB" sz="1800" dirty="0" err="1"/>
+              <a:t>Sensibilidad</a:t>
             </a:r>
             <a:r>
               <a:rPr lang="en-GB" sz="1800" dirty="0"/>

</xml_diff>